<commit_message>
On request of ETAS: Removed SCODE-CONGRA, except in history section of About page.
</commit_message>
<xml_diff>
--- a/static/media/resources/M04-example.pptx
+++ b/static/media/resources/M04-example.pptx
@@ -259,7 +259,7 @@
           <a:p>
             <a:fld id="{C921F836-B759-4535-AB7A-A1A0FF2C0E9A}" type="datetimeFigureOut">
               <a:rPr lang="en-US" smtClean="0"/>
-              <a:t>3/3/2023</a:t>
+              <a:t>3/31/2023</a:t>
             </a:fld>
             <a:endParaRPr lang="en-US"/>
           </a:p>
@@ -429,7 +429,7 @@
           <a:p>
             <a:fld id="{C921F836-B759-4535-AB7A-A1A0FF2C0E9A}" type="datetimeFigureOut">
               <a:rPr lang="en-US" smtClean="0"/>
-              <a:t>3/3/2023</a:t>
+              <a:t>3/31/2023</a:t>
             </a:fld>
             <a:endParaRPr lang="en-US"/>
           </a:p>
@@ -609,7 +609,7 @@
           <a:p>
             <a:fld id="{C921F836-B759-4535-AB7A-A1A0FF2C0E9A}" type="datetimeFigureOut">
               <a:rPr lang="en-US" smtClean="0"/>
-              <a:t>3/3/2023</a:t>
+              <a:t>3/31/2023</a:t>
             </a:fld>
             <a:endParaRPr lang="en-US"/>
           </a:p>
@@ -779,7 +779,7 @@
           <a:p>
             <a:fld id="{C921F836-B759-4535-AB7A-A1A0FF2C0E9A}" type="datetimeFigureOut">
               <a:rPr lang="en-US" smtClean="0"/>
-              <a:t>3/3/2023</a:t>
+              <a:t>3/31/2023</a:t>
             </a:fld>
             <a:endParaRPr lang="en-US"/>
           </a:p>
@@ -1025,7 +1025,7 @@
           <a:p>
             <a:fld id="{C921F836-B759-4535-AB7A-A1A0FF2C0E9A}" type="datetimeFigureOut">
               <a:rPr lang="en-US" smtClean="0"/>
-              <a:t>3/3/2023</a:t>
+              <a:t>3/31/2023</a:t>
             </a:fld>
             <a:endParaRPr lang="en-US"/>
           </a:p>
@@ -1257,7 +1257,7 @@
           <a:p>
             <a:fld id="{C921F836-B759-4535-AB7A-A1A0FF2C0E9A}" type="datetimeFigureOut">
               <a:rPr lang="en-US" smtClean="0"/>
-              <a:t>3/3/2023</a:t>
+              <a:t>3/31/2023</a:t>
             </a:fld>
             <a:endParaRPr lang="en-US"/>
           </a:p>
@@ -1624,7 +1624,7 @@
           <a:p>
             <a:fld id="{C921F836-B759-4535-AB7A-A1A0FF2C0E9A}" type="datetimeFigureOut">
               <a:rPr lang="en-US" smtClean="0"/>
-              <a:t>3/3/2023</a:t>
+              <a:t>3/31/2023</a:t>
             </a:fld>
             <a:endParaRPr lang="en-US"/>
           </a:p>
@@ -1742,7 +1742,7 @@
           <a:p>
             <a:fld id="{C921F836-B759-4535-AB7A-A1A0FF2C0E9A}" type="datetimeFigureOut">
               <a:rPr lang="en-US" smtClean="0"/>
-              <a:t>3/3/2023</a:t>
+              <a:t>3/31/2023</a:t>
             </a:fld>
             <a:endParaRPr lang="en-US"/>
           </a:p>
@@ -1837,7 +1837,7 @@
           <a:p>
             <a:fld id="{C921F836-B759-4535-AB7A-A1A0FF2C0E9A}" type="datetimeFigureOut">
               <a:rPr lang="en-US" smtClean="0"/>
-              <a:t>3/3/2023</a:t>
+              <a:t>3/31/2023</a:t>
             </a:fld>
             <a:endParaRPr lang="en-US"/>
           </a:p>
@@ -2114,7 +2114,7 @@
           <a:p>
             <a:fld id="{C921F836-B759-4535-AB7A-A1A0FF2C0E9A}" type="datetimeFigureOut">
               <a:rPr lang="en-US" smtClean="0"/>
-              <a:t>3/3/2023</a:t>
+              <a:t>3/31/2023</a:t>
             </a:fld>
             <a:endParaRPr lang="en-US"/>
           </a:p>
@@ -2367,7 +2367,7 @@
           <a:p>
             <a:fld id="{C921F836-B759-4535-AB7A-A1A0FF2C0E9A}" type="datetimeFigureOut">
               <a:rPr lang="en-US" smtClean="0"/>
-              <a:t>3/3/2023</a:t>
+              <a:t>3/31/2023</a:t>
             </a:fld>
             <a:endParaRPr lang="en-US"/>
           </a:p>
@@ -2580,7 +2580,7 @@
           <a:p>
             <a:fld id="{C921F836-B759-4535-AB7A-A1A0FF2C0E9A}" type="datetimeFigureOut">
               <a:rPr lang="en-US" smtClean="0"/>
-              <a:t>3/3/2023</a:t>
+              <a:t>3/31/2023</a:t>
             </a:fld>
             <a:endParaRPr lang="en-US"/>
           </a:p>
@@ -3794,7 +3794,7 @@
       </p:grpSpPr>
       <p:pic>
         <p:nvPicPr>
-          <p:cNvPr id="4" name="Picture 3"/>
+          <p:cNvPr id="3" name="Picture 2"/>
           <p:cNvPicPr>
             <a:picLocks noChangeAspect="1"/>
           </p:cNvPicPr>
@@ -3814,8 +3814,8 @@
         </p:blipFill>
         <p:spPr>
           <a:xfrm>
-            <a:off x="1731100" y="2261291"/>
-            <a:ext cx="2013053" cy="2286117"/>
+            <a:off x="1758023" y="2271579"/>
+            <a:ext cx="1962251" cy="1879697"/>
           </a:xfrm>
           <a:prstGeom prst="rect">
             <a:avLst/>
@@ -3923,8 +3923,8 @@
         </p:nvCxnSpPr>
         <p:spPr>
           <a:xfrm flipV="1">
-            <a:off x="3732620" y="2040011"/>
-            <a:ext cx="458210" cy="330177"/>
+            <a:off x="3732619" y="2040011"/>
+            <a:ext cx="458211" cy="330177"/>
           </a:xfrm>
           <a:prstGeom prst="bentConnector3">
             <a:avLst/>
@@ -3959,8 +3959,8 @@
         </p:nvSpPr>
         <p:spPr>
           <a:xfrm>
-            <a:off x="1731100" y="2256819"/>
-            <a:ext cx="2001520" cy="226737"/>
+            <a:off x="1758022" y="2256819"/>
+            <a:ext cx="1974597" cy="226737"/>
           </a:xfrm>
           <a:prstGeom prst="roundRect">
             <a:avLst/>
@@ -4034,8 +4034,8 @@
         </p:nvSpPr>
         <p:spPr>
           <a:xfrm>
-            <a:off x="1731100" y="2480339"/>
-            <a:ext cx="2001520" cy="226737"/>
+            <a:off x="1758022" y="2480339"/>
+            <a:ext cx="1974598" cy="226737"/>
           </a:xfrm>
           <a:prstGeom prst="roundRect">
             <a:avLst/>
@@ -4109,8 +4109,8 @@
         </p:nvSpPr>
         <p:spPr>
           <a:xfrm>
-            <a:off x="1731100" y="3689379"/>
-            <a:ext cx="2001520" cy="226737"/>
+            <a:off x="1745676" y="3895458"/>
+            <a:ext cx="1986943" cy="226737"/>
           </a:xfrm>
           <a:prstGeom prst="roundRect">
             <a:avLst/>
@@ -4335,8 +4335,8 @@
         </p:nvCxnSpPr>
         <p:spPr>
           <a:xfrm>
-            <a:off x="3732620" y="3802748"/>
-            <a:ext cx="458210" cy="340846"/>
+            <a:off x="3732619" y="4008827"/>
+            <a:ext cx="458211" cy="134767"/>
           </a:xfrm>
           <a:prstGeom prst="bentConnector3">
             <a:avLst>
@@ -4928,8 +4928,8 @@
         </p:nvSpPr>
         <p:spPr>
           <a:xfrm>
-            <a:off x="4162486" y="3311918"/>
-            <a:ext cx="1190454" cy="186650"/>
+            <a:off x="4190830" y="3311918"/>
+            <a:ext cx="1162110" cy="186650"/>
           </a:xfrm>
           <a:prstGeom prst="roundRect">
             <a:avLst/>
@@ -5011,7 +5011,7 @@
           </a:xfrm>
           <a:prstGeom prst="bentConnector3">
             <a:avLst>
-              <a:gd name="adj1" fmla="val 68197"/>
+              <a:gd name="adj1" fmla="val 50000"/>
             </a:avLst>
           </a:prstGeom>
           <a:ln w="31750">
@@ -5044,7 +5044,7 @@
         </p:nvSpPr>
         <p:spPr>
           <a:xfrm>
-            <a:off x="5388721" y="1659273"/>
+            <a:off x="5388721" y="1668798"/>
             <a:ext cx="1304244" cy="307777"/>
           </a:xfrm>
           <a:prstGeom prst="rect">
@@ -5134,8 +5134,8 @@
         </p:nvSpPr>
         <p:spPr>
           <a:xfrm>
-            <a:off x="4173284" y="1685712"/>
-            <a:ext cx="1211407" cy="237476"/>
+            <a:off x="4190830" y="1698412"/>
+            <a:ext cx="1193861" cy="237476"/>
           </a:xfrm>
           <a:prstGeom prst="roundRect">
             <a:avLst/>
@@ -5209,8 +5209,8 @@
         </p:nvSpPr>
         <p:spPr>
           <a:xfrm>
-            <a:off x="4166181" y="4724401"/>
-            <a:ext cx="1186759" cy="223520"/>
+            <a:off x="4190830" y="4733926"/>
+            <a:ext cx="1162110" cy="223520"/>
           </a:xfrm>
           <a:prstGeom prst="roundRect">
             <a:avLst/>

</xml_diff>

<commit_message>
Fixed link in image.
</commit_message>
<xml_diff>
--- a/static/media/resources/M04-example.pptx
+++ b/static/media/resources/M04-example.pptx
@@ -259,7 +259,7 @@
           <a:p>
             <a:fld id="{C921F836-B759-4535-AB7A-A1A0FF2C0E9A}" type="datetimeFigureOut">
               <a:rPr lang="en-US" smtClean="0"/>
-              <a:t>3/31/2023</a:t>
+              <a:t>5/26/2023</a:t>
             </a:fld>
             <a:endParaRPr lang="en-US"/>
           </a:p>
@@ -429,7 +429,7 @@
           <a:p>
             <a:fld id="{C921F836-B759-4535-AB7A-A1A0FF2C0E9A}" type="datetimeFigureOut">
               <a:rPr lang="en-US" smtClean="0"/>
-              <a:t>3/31/2023</a:t>
+              <a:t>5/26/2023</a:t>
             </a:fld>
             <a:endParaRPr lang="en-US"/>
           </a:p>
@@ -609,7 +609,7 @@
           <a:p>
             <a:fld id="{C921F836-B759-4535-AB7A-A1A0FF2C0E9A}" type="datetimeFigureOut">
               <a:rPr lang="en-US" smtClean="0"/>
-              <a:t>3/31/2023</a:t>
+              <a:t>5/26/2023</a:t>
             </a:fld>
             <a:endParaRPr lang="en-US"/>
           </a:p>
@@ -779,7 +779,7 @@
           <a:p>
             <a:fld id="{C921F836-B759-4535-AB7A-A1A0FF2C0E9A}" type="datetimeFigureOut">
               <a:rPr lang="en-US" smtClean="0"/>
-              <a:t>3/31/2023</a:t>
+              <a:t>5/26/2023</a:t>
             </a:fld>
             <a:endParaRPr lang="en-US"/>
           </a:p>
@@ -1025,7 +1025,7 @@
           <a:p>
             <a:fld id="{C921F836-B759-4535-AB7A-A1A0FF2C0E9A}" type="datetimeFigureOut">
               <a:rPr lang="en-US" smtClean="0"/>
-              <a:t>3/31/2023</a:t>
+              <a:t>5/26/2023</a:t>
             </a:fld>
             <a:endParaRPr lang="en-US"/>
           </a:p>
@@ -1257,7 +1257,7 @@
           <a:p>
             <a:fld id="{C921F836-B759-4535-AB7A-A1A0FF2C0E9A}" type="datetimeFigureOut">
               <a:rPr lang="en-US" smtClean="0"/>
-              <a:t>3/31/2023</a:t>
+              <a:t>5/26/2023</a:t>
             </a:fld>
             <a:endParaRPr lang="en-US"/>
           </a:p>
@@ -1624,7 +1624,7 @@
           <a:p>
             <a:fld id="{C921F836-B759-4535-AB7A-A1A0FF2C0E9A}" type="datetimeFigureOut">
               <a:rPr lang="en-US" smtClean="0"/>
-              <a:t>3/31/2023</a:t>
+              <a:t>5/26/2023</a:t>
             </a:fld>
             <a:endParaRPr lang="en-US"/>
           </a:p>
@@ -1742,7 +1742,7 @@
           <a:p>
             <a:fld id="{C921F836-B759-4535-AB7A-A1A0FF2C0E9A}" type="datetimeFigureOut">
               <a:rPr lang="en-US" smtClean="0"/>
-              <a:t>3/31/2023</a:t>
+              <a:t>5/26/2023</a:t>
             </a:fld>
             <a:endParaRPr lang="en-US"/>
           </a:p>
@@ -1837,7 +1837,7 @@
           <a:p>
             <a:fld id="{C921F836-B759-4535-AB7A-A1A0FF2C0E9A}" type="datetimeFigureOut">
               <a:rPr lang="en-US" smtClean="0"/>
-              <a:t>3/31/2023</a:t>
+              <a:t>5/26/2023</a:t>
             </a:fld>
             <a:endParaRPr lang="en-US"/>
           </a:p>
@@ -2114,7 +2114,7 @@
           <a:p>
             <a:fld id="{C921F836-B759-4535-AB7A-A1A0FF2C0E9A}" type="datetimeFigureOut">
               <a:rPr lang="en-US" smtClean="0"/>
-              <a:t>3/31/2023</a:t>
+              <a:t>5/26/2023</a:t>
             </a:fld>
             <a:endParaRPr lang="en-US"/>
           </a:p>
@@ -2367,7 +2367,7 @@
           <a:p>
             <a:fld id="{C921F836-B759-4535-AB7A-A1A0FF2C0E9A}" type="datetimeFigureOut">
               <a:rPr lang="en-US" smtClean="0"/>
-              <a:t>3/31/2023</a:t>
+              <a:t>5/26/2023</a:t>
             </a:fld>
             <a:endParaRPr lang="en-US"/>
           </a:p>
@@ -2580,7 +2580,7 @@
           <a:p>
             <a:fld id="{C921F836-B759-4535-AB7A-A1A0FF2C0E9A}" type="datetimeFigureOut">
               <a:rPr lang="en-US" smtClean="0"/>
-              <a:t>3/31/2023</a:t>
+              <a:t>5/26/2023</a:t>
             </a:fld>
             <a:endParaRPr lang="en-US"/>
           </a:p>
@@ -4109,7 +4109,7 @@
         </p:nvSpPr>
         <p:spPr>
           <a:xfrm>
-            <a:off x="1745676" y="3895458"/>
+            <a:off x="1745676" y="3295383"/>
             <a:ext cx="1986943" cy="226737"/>
           </a:xfrm>
           <a:prstGeom prst="roundRect">
@@ -4335,8 +4335,8 @@
         </p:nvCxnSpPr>
         <p:spPr>
           <a:xfrm>
-            <a:off x="3732619" y="4008827"/>
-            <a:ext cx="458211" cy="134767"/>
+            <a:off x="3732619" y="3408752"/>
+            <a:ext cx="458211" cy="734842"/>
           </a:xfrm>
           <a:prstGeom prst="bentConnector3">
             <a:avLst>
@@ -5011,7 +5011,7 @@
           </a:xfrm>
           <a:prstGeom prst="bentConnector3">
             <a:avLst>
-              <a:gd name="adj1" fmla="val 50000"/>
+              <a:gd name="adj1" fmla="val 68481"/>
             </a:avLst>
           </a:prstGeom>
           <a:ln w="31750">

</xml_diff>